<commit_message>
updated background image to show current code
</commit_message>
<xml_diff>
--- a/www/plumbing/CodeImage.pptx
+++ b/www/plumbing/CodeImage.pptx
@@ -8,6 +8,7 @@
     <p:sldId id="256" r:id="rId2"/>
     <p:sldId id="257" r:id="rId3"/>
     <p:sldId id="258" r:id="rId4"/>
+    <p:sldId id="259" r:id="rId5"/>
   </p:sldIdLst>
   <p:sldSz cx="9144000" cy="6858000" type="screen4x3"/>
   <p:notesSz cx="6858000" cy="9144000"/>
@@ -290,7 +291,7 @@
           <a:p>
             <a:fld id="{8D4A803F-412C-9847-B6C2-FD93C63CC1F4}" type="datetimeFigureOut">
               <a:rPr lang="en-US" smtClean="0"/>
-              <a:t>9/12/18</a:t>
+              <a:t>2/1/19</a:t>
             </a:fld>
             <a:endParaRPr lang="en-US"/>
           </a:p>
@@ -460,7 +461,7 @@
           <a:p>
             <a:fld id="{8D4A803F-412C-9847-B6C2-FD93C63CC1F4}" type="datetimeFigureOut">
               <a:rPr lang="en-US" smtClean="0"/>
-              <a:t>9/12/18</a:t>
+              <a:t>2/1/19</a:t>
             </a:fld>
             <a:endParaRPr lang="en-US"/>
           </a:p>
@@ -640,7 +641,7 @@
           <a:p>
             <a:fld id="{8D4A803F-412C-9847-B6C2-FD93C63CC1F4}" type="datetimeFigureOut">
               <a:rPr lang="en-US" smtClean="0"/>
-              <a:t>9/12/18</a:t>
+              <a:t>2/1/19</a:t>
             </a:fld>
             <a:endParaRPr lang="en-US"/>
           </a:p>
@@ -810,7 +811,7 @@
           <a:p>
             <a:fld id="{8D4A803F-412C-9847-B6C2-FD93C63CC1F4}" type="datetimeFigureOut">
               <a:rPr lang="en-US" smtClean="0"/>
-              <a:t>9/12/18</a:t>
+              <a:t>2/1/19</a:t>
             </a:fld>
             <a:endParaRPr lang="en-US"/>
           </a:p>
@@ -1056,7 +1057,7 @@
           <a:p>
             <a:fld id="{8D4A803F-412C-9847-B6C2-FD93C63CC1F4}" type="datetimeFigureOut">
               <a:rPr lang="en-US" smtClean="0"/>
-              <a:t>9/12/18</a:t>
+              <a:t>2/1/19</a:t>
             </a:fld>
             <a:endParaRPr lang="en-US"/>
           </a:p>
@@ -1344,7 +1345,7 @@
           <a:p>
             <a:fld id="{8D4A803F-412C-9847-B6C2-FD93C63CC1F4}" type="datetimeFigureOut">
               <a:rPr lang="en-US" smtClean="0"/>
-              <a:t>9/12/18</a:t>
+              <a:t>2/1/19</a:t>
             </a:fld>
             <a:endParaRPr lang="en-US"/>
           </a:p>
@@ -1766,7 +1767,7 @@
           <a:p>
             <a:fld id="{8D4A803F-412C-9847-B6C2-FD93C63CC1F4}" type="datetimeFigureOut">
               <a:rPr lang="en-US" smtClean="0"/>
-              <a:t>9/12/18</a:t>
+              <a:t>2/1/19</a:t>
             </a:fld>
             <a:endParaRPr lang="en-US"/>
           </a:p>
@@ -1884,7 +1885,7 @@
           <a:p>
             <a:fld id="{8D4A803F-412C-9847-B6C2-FD93C63CC1F4}" type="datetimeFigureOut">
               <a:rPr lang="en-US" smtClean="0"/>
-              <a:t>9/12/18</a:t>
+              <a:t>2/1/19</a:t>
             </a:fld>
             <a:endParaRPr lang="en-US"/>
           </a:p>
@@ -1979,7 +1980,7 @@
           <a:p>
             <a:fld id="{8D4A803F-412C-9847-B6C2-FD93C63CC1F4}" type="datetimeFigureOut">
               <a:rPr lang="en-US" smtClean="0"/>
-              <a:t>9/12/18</a:t>
+              <a:t>2/1/19</a:t>
             </a:fld>
             <a:endParaRPr lang="en-US"/>
           </a:p>
@@ -2256,7 +2257,7 @@
           <a:p>
             <a:fld id="{8D4A803F-412C-9847-B6C2-FD93C63CC1F4}" type="datetimeFigureOut">
               <a:rPr lang="en-US" smtClean="0"/>
-              <a:t>9/12/18</a:t>
+              <a:t>2/1/19</a:t>
             </a:fld>
             <a:endParaRPr lang="en-US"/>
           </a:p>
@@ -2509,7 +2510,7 @@
           <a:p>
             <a:fld id="{8D4A803F-412C-9847-B6C2-FD93C63CC1F4}" type="datetimeFigureOut">
               <a:rPr lang="en-US" smtClean="0"/>
-              <a:t>9/12/18</a:t>
+              <a:t>2/1/19</a:t>
             </a:fld>
             <a:endParaRPr lang="en-US"/>
           </a:p>
@@ -2722,7 +2723,7 @@
           <a:p>
             <a:fld id="{8D4A803F-412C-9847-B6C2-FD93C63CC1F4}" type="datetimeFigureOut">
               <a:rPr lang="en-US" smtClean="0"/>
-              <a:t>9/12/18</a:t>
+              <a:t>2/1/19</a:t>
             </a:fld>
             <a:endParaRPr lang="en-US"/>
           </a:p>
@@ -4338,6 +4339,561 @@
 </p:sld>
 </file>
 
+<file path=ppt/slides/slide4.xml><?xml version="1.0" encoding="utf-8"?>
+<p:sld xmlns:a="http://schemas.openxmlformats.org/drawingml/2006/main" xmlns:r="http://schemas.openxmlformats.org/officeDocument/2006/relationships" xmlns:p="http://schemas.openxmlformats.org/presentationml/2006/main">
+  <p:cSld>
+    <p:spTree>
+      <p:nvGrpSpPr>
+        <p:cNvPr id="1" name=""/>
+        <p:cNvGrpSpPr/>
+        <p:nvPr/>
+      </p:nvGrpSpPr>
+      <p:grpSpPr>
+        <a:xfrm>
+          <a:off x="0" y="0"/>
+          <a:ext cx="0" cy="0"/>
+          <a:chOff x="0" y="0"/>
+          <a:chExt cx="0" cy="0"/>
+        </a:xfrm>
+      </p:grpSpPr>
+      <p:pic>
+        <p:nvPicPr>
+          <p:cNvPr id="4" name="Picture 3" descr="Screen-2019-01-02_16-46-33.jpg"/>
+          <p:cNvPicPr>
+            <a:picLocks noChangeAspect="1"/>
+          </p:cNvPicPr>
+          <p:nvPr/>
+        </p:nvPicPr>
+        <p:blipFill>
+          <a:blip r:embed="rId2">
+            <a:extLst>
+              <a:ext uri="{28A0092B-C50C-407E-A947-70E740481C1C}">
+                <a14:useLocalDpi xmlns:a14="http://schemas.microsoft.com/office/drawing/2010/main" val="0"/>
+              </a:ext>
+            </a:extLst>
+          </a:blip>
+          <a:stretch>
+            <a:fillRect/>
+          </a:stretch>
+        </p:blipFill>
+        <p:spPr>
+          <a:xfrm>
+            <a:off x="0" y="254000"/>
+            <a:ext cx="9144000" cy="6324648"/>
+          </a:xfrm>
+          <a:prstGeom prst="rect">
+            <a:avLst/>
+          </a:prstGeom>
+        </p:spPr>
+      </p:pic>
+      <p:grpSp>
+        <p:nvGrpSpPr>
+          <p:cNvPr id="5" name="Group 4"/>
+          <p:cNvGrpSpPr/>
+          <p:nvPr/>
+        </p:nvGrpSpPr>
+        <p:grpSpPr>
+          <a:xfrm>
+            <a:off x="6093753" y="513278"/>
+            <a:ext cx="1345443" cy="370047"/>
+            <a:chOff x="6120771" y="189140"/>
+            <a:chExt cx="1345443" cy="370047"/>
+          </a:xfrm>
+        </p:grpSpPr>
+        <p:sp>
+          <p:nvSpPr>
+            <p:cNvPr id="6" name="Rounded Rectangle 5"/>
+            <p:cNvSpPr/>
+            <p:nvPr/>
+          </p:nvSpPr>
+          <p:spPr>
+            <a:xfrm>
+              <a:off x="6120771" y="189140"/>
+              <a:ext cx="1345443" cy="370047"/>
+            </a:xfrm>
+            <a:prstGeom prst="roundRect">
+              <a:avLst>
+                <a:gd name="adj" fmla="val 41670"/>
+              </a:avLst>
+            </a:prstGeom>
+            <a:noFill/>
+            <a:ln>
+              <a:solidFill>
+                <a:srgbClr val="1AC103"/>
+              </a:solidFill>
+            </a:ln>
+          </p:spPr>
+          <p:style>
+            <a:lnRef idx="1">
+              <a:schemeClr val="accent1"/>
+            </a:lnRef>
+            <a:fillRef idx="3">
+              <a:schemeClr val="accent1"/>
+            </a:fillRef>
+            <a:effectRef idx="2">
+              <a:schemeClr val="accent1"/>
+            </a:effectRef>
+            <a:fontRef idx="minor">
+              <a:schemeClr val="lt1"/>
+            </a:fontRef>
+          </p:style>
+          <p:txBody>
+            <a:bodyPr rtlCol="0" anchor="ctr"/>
+            <a:lstStyle/>
+            <a:p>
+              <a:pPr algn="ctr"/>
+              <a:endParaRPr lang="en-US"/>
+            </a:p>
+          </p:txBody>
+        </p:sp>
+        <p:sp>
+          <p:nvSpPr>
+            <p:cNvPr id="7" name="TextBox 6"/>
+            <p:cNvSpPr txBox="1"/>
+            <p:nvPr/>
+          </p:nvSpPr>
+          <p:spPr>
+            <a:xfrm>
+              <a:off x="6201840" y="210880"/>
+              <a:ext cx="1223838" cy="307777"/>
+            </a:xfrm>
+            <a:prstGeom prst="rect">
+              <a:avLst/>
+            </a:prstGeom>
+            <a:noFill/>
+          </p:spPr>
+          <p:txBody>
+            <a:bodyPr wrap="none" rtlCol="0">
+              <a:spAutoFit/>
+            </a:bodyPr>
+            <a:lstStyle/>
+            <a:p>
+              <a:r>
+                <a:rPr lang="en-US" sz="1400" dirty="0" smtClean="0">
+                  <a:solidFill>
+                    <a:srgbClr val="1AC103"/>
+                  </a:solidFill>
+                </a:rPr>
+                <a:t>Sound factory</a:t>
+              </a:r>
+              <a:endParaRPr lang="en-US" sz="1400" dirty="0">
+                <a:solidFill>
+                  <a:srgbClr val="1AC103"/>
+                </a:solidFill>
+              </a:endParaRPr>
+            </a:p>
+          </p:txBody>
+        </p:sp>
+      </p:grpSp>
+      <p:grpSp>
+        <p:nvGrpSpPr>
+          <p:cNvPr id="8" name="Group 7"/>
+          <p:cNvGrpSpPr/>
+          <p:nvPr/>
+        </p:nvGrpSpPr>
+        <p:grpSpPr>
+          <a:xfrm>
+            <a:off x="5877561" y="1041962"/>
+            <a:ext cx="1385982" cy="370047"/>
+            <a:chOff x="6080232" y="189140"/>
+            <a:chExt cx="1385982" cy="370047"/>
+          </a:xfrm>
+        </p:grpSpPr>
+        <p:sp>
+          <p:nvSpPr>
+            <p:cNvPr id="9" name="Rounded Rectangle 8"/>
+            <p:cNvSpPr/>
+            <p:nvPr/>
+          </p:nvSpPr>
+          <p:spPr>
+            <a:xfrm>
+              <a:off x="6120771" y="189140"/>
+              <a:ext cx="1345443" cy="370047"/>
+            </a:xfrm>
+            <a:prstGeom prst="roundRect">
+              <a:avLst>
+                <a:gd name="adj" fmla="val 41670"/>
+              </a:avLst>
+            </a:prstGeom>
+            <a:noFill/>
+            <a:ln>
+              <a:solidFill>
+                <a:srgbClr val="1AC103"/>
+              </a:solidFill>
+            </a:ln>
+          </p:spPr>
+          <p:style>
+            <a:lnRef idx="1">
+              <a:schemeClr val="accent1"/>
+            </a:lnRef>
+            <a:fillRef idx="3">
+              <a:schemeClr val="accent1"/>
+            </a:fillRef>
+            <a:effectRef idx="2">
+              <a:schemeClr val="accent1"/>
+            </a:effectRef>
+            <a:fontRef idx="minor">
+              <a:schemeClr val="lt1"/>
+            </a:fontRef>
+          </p:style>
+          <p:txBody>
+            <a:bodyPr rtlCol="0" anchor="ctr"/>
+            <a:lstStyle/>
+            <a:p>
+              <a:pPr algn="ctr"/>
+              <a:endParaRPr lang="en-US"/>
+            </a:p>
+          </p:txBody>
+        </p:sp>
+        <p:sp>
+          <p:nvSpPr>
+            <p:cNvPr id="10" name="TextBox 9"/>
+            <p:cNvSpPr txBox="1"/>
+            <p:nvPr/>
+          </p:nvSpPr>
+          <p:spPr>
+            <a:xfrm>
+              <a:off x="6080232" y="210880"/>
+              <a:ext cx="1033080" cy="307777"/>
+            </a:xfrm>
+            <a:prstGeom prst="rect">
+              <a:avLst/>
+            </a:prstGeom>
+            <a:noFill/>
+          </p:spPr>
+          <p:txBody>
+            <a:bodyPr wrap="none" rtlCol="0">
+              <a:spAutoFit/>
+            </a:bodyPr>
+            <a:lstStyle/>
+            <a:p>
+              <a:r>
+                <a:rPr lang="en-US" sz="1400" dirty="0" smtClean="0">
+                  <a:solidFill>
+                    <a:srgbClr val="1AC103"/>
+                  </a:solidFill>
+                </a:rPr>
+                <a:t>         Create</a:t>
+              </a:r>
+              <a:endParaRPr lang="en-US" sz="1400" dirty="0">
+                <a:solidFill>
+                  <a:srgbClr val="1AC103"/>
+                </a:solidFill>
+              </a:endParaRPr>
+            </a:p>
+          </p:txBody>
+        </p:sp>
+      </p:grpSp>
+      <p:grpSp>
+        <p:nvGrpSpPr>
+          <p:cNvPr id="11" name="Group 10"/>
+          <p:cNvGrpSpPr/>
+          <p:nvPr/>
+        </p:nvGrpSpPr>
+        <p:grpSpPr>
+          <a:xfrm>
+            <a:off x="3105695" y="1682200"/>
+            <a:ext cx="1345443" cy="370047"/>
+            <a:chOff x="6120771" y="189140"/>
+            <a:chExt cx="1345443" cy="370047"/>
+          </a:xfrm>
+        </p:grpSpPr>
+        <p:sp>
+          <p:nvSpPr>
+            <p:cNvPr id="12" name="Rounded Rectangle 11"/>
+            <p:cNvSpPr/>
+            <p:nvPr/>
+          </p:nvSpPr>
+          <p:spPr>
+            <a:xfrm>
+              <a:off x="6120771" y="189140"/>
+              <a:ext cx="1345443" cy="370047"/>
+            </a:xfrm>
+            <a:prstGeom prst="roundRect">
+              <a:avLst>
+                <a:gd name="adj" fmla="val 41670"/>
+              </a:avLst>
+            </a:prstGeom>
+            <a:noFill/>
+            <a:ln>
+              <a:solidFill>
+                <a:srgbClr val="1AC103"/>
+              </a:solidFill>
+            </a:ln>
+          </p:spPr>
+          <p:style>
+            <a:lnRef idx="1">
+              <a:schemeClr val="accent1"/>
+            </a:lnRef>
+            <a:fillRef idx="3">
+              <a:schemeClr val="accent1"/>
+            </a:fillRef>
+            <a:effectRef idx="2">
+              <a:schemeClr val="accent1"/>
+            </a:effectRef>
+            <a:fontRef idx="minor">
+              <a:schemeClr val="lt1"/>
+            </a:fontRef>
+          </p:style>
+          <p:txBody>
+            <a:bodyPr rtlCol="0" anchor="ctr"/>
+            <a:lstStyle/>
+            <a:p>
+              <a:pPr algn="ctr"/>
+              <a:endParaRPr lang="en-US"/>
+            </a:p>
+          </p:txBody>
+        </p:sp>
+        <p:sp>
+          <p:nvSpPr>
+            <p:cNvPr id="13" name="TextBox 12"/>
+            <p:cNvSpPr txBox="1"/>
+            <p:nvPr/>
+          </p:nvSpPr>
+          <p:spPr>
+            <a:xfrm>
+              <a:off x="6566667" y="211390"/>
+              <a:ext cx="487458" cy="307777"/>
+            </a:xfrm>
+            <a:prstGeom prst="rect">
+              <a:avLst/>
+            </a:prstGeom>
+            <a:noFill/>
+          </p:spPr>
+          <p:txBody>
+            <a:bodyPr wrap="none" rtlCol="0">
+              <a:spAutoFit/>
+            </a:bodyPr>
+            <a:lstStyle/>
+            <a:p>
+              <a:r>
+                <a:rPr lang="en-US" sz="1400" dirty="0" smtClean="0">
+                  <a:solidFill>
+                    <a:srgbClr val="1AC103"/>
+                  </a:solidFill>
+                </a:rPr>
+                <a:t>play</a:t>
+              </a:r>
+              <a:endParaRPr lang="en-US" sz="1400" dirty="0">
+                <a:solidFill>
+                  <a:srgbClr val="1AC103"/>
+                </a:solidFill>
+              </a:endParaRPr>
+            </a:p>
+          </p:txBody>
+        </p:sp>
+      </p:grpSp>
+      <p:grpSp>
+        <p:nvGrpSpPr>
+          <p:cNvPr id="14" name="Group 13"/>
+          <p:cNvGrpSpPr/>
+          <p:nvPr/>
+        </p:nvGrpSpPr>
+        <p:grpSpPr>
+          <a:xfrm>
+            <a:off x="3105695" y="2519818"/>
+            <a:ext cx="1345443" cy="370047"/>
+            <a:chOff x="6120771" y="189140"/>
+            <a:chExt cx="1345443" cy="370047"/>
+          </a:xfrm>
+        </p:grpSpPr>
+        <p:sp>
+          <p:nvSpPr>
+            <p:cNvPr id="15" name="Rounded Rectangle 14"/>
+            <p:cNvSpPr/>
+            <p:nvPr/>
+          </p:nvSpPr>
+          <p:spPr>
+            <a:xfrm>
+              <a:off x="6120771" y="189140"/>
+              <a:ext cx="1345443" cy="370047"/>
+            </a:xfrm>
+            <a:prstGeom prst="roundRect">
+              <a:avLst>
+                <a:gd name="adj" fmla="val 41670"/>
+              </a:avLst>
+            </a:prstGeom>
+            <a:noFill/>
+            <a:ln>
+              <a:solidFill>
+                <a:srgbClr val="1AC103"/>
+              </a:solidFill>
+            </a:ln>
+          </p:spPr>
+          <p:style>
+            <a:lnRef idx="1">
+              <a:schemeClr val="accent1"/>
+            </a:lnRef>
+            <a:fillRef idx="3">
+              <a:schemeClr val="accent1"/>
+            </a:fillRef>
+            <a:effectRef idx="2">
+              <a:schemeClr val="accent1"/>
+            </a:effectRef>
+            <a:fontRef idx="minor">
+              <a:schemeClr val="lt1"/>
+            </a:fontRef>
+          </p:style>
+          <p:txBody>
+            <a:bodyPr rtlCol="0" anchor="ctr"/>
+            <a:lstStyle/>
+            <a:p>
+              <a:pPr algn="ctr"/>
+              <a:endParaRPr lang="en-US"/>
+            </a:p>
+          </p:txBody>
+        </p:sp>
+        <p:sp>
+          <p:nvSpPr>
+            <p:cNvPr id="16" name="TextBox 15"/>
+            <p:cNvSpPr txBox="1"/>
+            <p:nvPr/>
+          </p:nvSpPr>
+          <p:spPr>
+            <a:xfrm>
+              <a:off x="6566667" y="211390"/>
+              <a:ext cx="505267" cy="307777"/>
+            </a:xfrm>
+            <a:prstGeom prst="rect">
+              <a:avLst/>
+            </a:prstGeom>
+            <a:noFill/>
+          </p:spPr>
+          <p:txBody>
+            <a:bodyPr wrap="none" rtlCol="0">
+              <a:spAutoFit/>
+            </a:bodyPr>
+            <a:lstStyle/>
+            <a:p>
+              <a:r>
+                <a:rPr lang="en-US" sz="1400" dirty="0" smtClean="0">
+                  <a:solidFill>
+                    <a:srgbClr val="1AC103"/>
+                  </a:solidFill>
+                </a:rPr>
+                <a:t>stop</a:t>
+              </a:r>
+              <a:endParaRPr lang="en-US" sz="1400" dirty="0">
+                <a:solidFill>
+                  <a:srgbClr val="1AC103"/>
+                </a:solidFill>
+              </a:endParaRPr>
+            </a:p>
+          </p:txBody>
+        </p:sp>
+      </p:grpSp>
+      <p:grpSp>
+        <p:nvGrpSpPr>
+          <p:cNvPr id="17" name="Group 16"/>
+          <p:cNvGrpSpPr/>
+          <p:nvPr/>
+        </p:nvGrpSpPr>
+        <p:grpSpPr>
+          <a:xfrm>
+            <a:off x="1781568" y="3106353"/>
+            <a:ext cx="1345443" cy="370047"/>
+            <a:chOff x="6120771" y="189140"/>
+            <a:chExt cx="1345443" cy="370047"/>
+          </a:xfrm>
+        </p:grpSpPr>
+        <p:sp>
+          <p:nvSpPr>
+            <p:cNvPr id="18" name="Rounded Rectangle 17"/>
+            <p:cNvSpPr/>
+            <p:nvPr/>
+          </p:nvSpPr>
+          <p:spPr>
+            <a:xfrm>
+              <a:off x="6120771" y="189140"/>
+              <a:ext cx="1345443" cy="370047"/>
+            </a:xfrm>
+            <a:prstGeom prst="roundRect">
+              <a:avLst>
+                <a:gd name="adj" fmla="val 41670"/>
+              </a:avLst>
+            </a:prstGeom>
+            <a:noFill/>
+            <a:ln>
+              <a:solidFill>
+                <a:srgbClr val="1AC103"/>
+              </a:solidFill>
+            </a:ln>
+          </p:spPr>
+          <p:style>
+            <a:lnRef idx="1">
+              <a:schemeClr val="accent1"/>
+            </a:lnRef>
+            <a:fillRef idx="3">
+              <a:schemeClr val="accent1"/>
+            </a:fillRef>
+            <a:effectRef idx="2">
+              <a:schemeClr val="accent1"/>
+            </a:effectRef>
+            <a:fontRef idx="minor">
+              <a:schemeClr val="lt1"/>
+            </a:fontRef>
+          </p:style>
+          <p:txBody>
+            <a:bodyPr rtlCol="0" anchor="ctr"/>
+            <a:lstStyle/>
+            <a:p>
+              <a:pPr algn="ctr"/>
+              <a:endParaRPr lang="en-US"/>
+            </a:p>
+          </p:txBody>
+        </p:sp>
+        <p:sp>
+          <p:nvSpPr>
+            <p:cNvPr id="19" name="TextBox 18"/>
+            <p:cNvSpPr txBox="1"/>
+            <p:nvPr/>
+          </p:nvSpPr>
+          <p:spPr>
+            <a:xfrm>
+              <a:off x="6458571" y="211390"/>
+              <a:ext cx="754308" cy="307777"/>
+            </a:xfrm>
+            <a:prstGeom prst="rect">
+              <a:avLst/>
+            </a:prstGeom>
+            <a:noFill/>
+          </p:spPr>
+          <p:txBody>
+            <a:bodyPr wrap="none" rtlCol="0">
+              <a:spAutoFit/>
+            </a:bodyPr>
+            <a:lstStyle/>
+            <a:p>
+              <a:r>
+                <a:rPr lang="en-US" sz="1400" dirty="0" smtClean="0">
+                  <a:solidFill>
+                    <a:srgbClr val="1AC103"/>
+                  </a:solidFill>
+                </a:rPr>
+                <a:t>interact</a:t>
+              </a:r>
+              <a:endParaRPr lang="en-US" sz="1400" dirty="0">
+                <a:solidFill>
+                  <a:srgbClr val="1AC103"/>
+                </a:solidFill>
+              </a:endParaRPr>
+            </a:p>
+          </p:txBody>
+        </p:sp>
+      </p:grpSp>
+    </p:spTree>
+    <p:extLst>
+      <p:ext uri="{BB962C8B-B14F-4D97-AF65-F5344CB8AC3E}">
+        <p14:creationId xmlns:p14="http://schemas.microsoft.com/office/powerpoint/2010/main" val="2031651408"/>
+      </p:ext>
+    </p:extLst>
+  </p:cSld>
+  <p:clrMapOvr>
+    <a:masterClrMapping/>
+  </p:clrMapOvr>
+</p:sld>
+</file>
+
 <file path=ppt/theme/theme1.xml><?xml version="1.0" encoding="utf-8"?>
 <a:theme xmlns:a="http://schemas.openxmlformats.org/drawingml/2006/main" name="Office Theme">
   <a:themeElements>

</xml_diff>